<commit_message>
MA_06_03_CO Ajustes CE Versión actualizada MC
Ajustes solicitados por Editor
</commit_message>
<xml_diff>
--- a/fuentes/contenidos/grado06/guion03/MA_06_03_CO_Mapa conceptual.pptx
+++ b/fuentes/contenidos/grado06/guion03/MA_06_03_CO_Mapa conceptual.pptx
@@ -11,7 +11,7 @@
     <p:sldId id="256" r:id="rId2"/>
   </p:sldIdLst>
   <p:sldSz cx="9144000" cy="6858000" type="letter"/>
-  <p:notesSz cx="6794500" cy="9918700"/>
+  <p:notesSz cx="7315200" cy="9601200"/>
   <p:defaultTextStyle>
     <a:defPPr>
       <a:defRPr lang="es-ES"/>
@@ -149,8 +149,8 @@
         </p:nvSpPr>
         <p:spPr>
           <a:xfrm>
-            <a:off x="0" y="0"/>
-            <a:ext cx="2944813" cy="496888"/>
+            <a:off x="1" y="0"/>
+            <a:ext cx="3170490" cy="480982"/>
           </a:xfrm>
           <a:prstGeom prst="rect">
             <a:avLst/>
@@ -180,8 +180,8 @@
         </p:nvSpPr>
         <p:spPr>
           <a:xfrm>
-            <a:off x="3848100" y="0"/>
-            <a:ext cx="2944813" cy="496888"/>
+            <a:off x="4143002" y="0"/>
+            <a:ext cx="3170490" cy="480982"/>
           </a:xfrm>
           <a:prstGeom prst="rect">
             <a:avLst/>
@@ -197,7 +197,7 @@
           <a:p>
             <a:fld id="{20AB9387-143E-47DA-B93D-57DFE0F8E0AF}" type="datetimeFigureOut">
               <a:rPr lang="es-CO" smtClean="0"/>
-              <a:t>21/10/2015</a:t>
+              <a:t>15/12/2015</a:t>
             </a:fld>
             <a:endParaRPr lang="es-CO"/>
           </a:p>
@@ -215,8 +215,8 @@
         </p:nvSpPr>
         <p:spPr>
           <a:xfrm>
-            <a:off x="1165225" y="1239838"/>
-            <a:ext cx="4464050" cy="3348037"/>
+            <a:off x="1497013" y="1200150"/>
+            <a:ext cx="4321175" cy="3240088"/>
           </a:xfrm>
           <a:prstGeom prst="rect">
             <a:avLst/>
@@ -248,8 +248,8 @@
         </p:nvSpPr>
         <p:spPr>
           <a:xfrm>
-            <a:off x="679450" y="4773613"/>
-            <a:ext cx="5435600" cy="3905250"/>
+            <a:off x="731520" y="4620808"/>
+            <a:ext cx="5852160" cy="3780242"/>
           </a:xfrm>
           <a:prstGeom prst="rect">
             <a:avLst/>
@@ -308,8 +308,8 @@
         </p:nvSpPr>
         <p:spPr>
           <a:xfrm>
-            <a:off x="0" y="9421813"/>
-            <a:ext cx="2944813" cy="496887"/>
+            <a:off x="1" y="9120219"/>
+            <a:ext cx="3170490" cy="480982"/>
           </a:xfrm>
           <a:prstGeom prst="rect">
             <a:avLst/>
@@ -339,8 +339,8 @@
         </p:nvSpPr>
         <p:spPr>
           <a:xfrm>
-            <a:off x="3848100" y="9421813"/>
-            <a:ext cx="2944813" cy="496887"/>
+            <a:off x="4143002" y="9120219"/>
+            <a:ext cx="3170490" cy="480982"/>
           </a:xfrm>
           <a:prstGeom prst="rect">
             <a:avLst/>
@@ -887,7 +887,7 @@
           <a:p>
             <a:fld id="{5001C876-01F7-4317-94B9-1AE222133113}" type="datetimeFigureOut">
               <a:rPr lang="es-ES" smtClean="0"/>
-              <a:t>21/10/2015</a:t>
+              <a:t>15/12/2015</a:t>
             </a:fld>
             <a:endParaRPr lang="es-ES"/>
           </a:p>
@@ -1095,7 +1095,14 @@
                 <a:latin typeface="Arial" panose="020B0604020202020204" pitchFamily="34" charset="0"/>
                 <a:cs typeface="Arial" panose="020B0604020202020204" pitchFamily="34" charset="0"/>
               </a:rPr>
-              <a:t>© Editorial Planeta Colombiana S.A., 2015.</a:t>
+              <a:t>© Editorial Planeta Colombiana S.A., </a:t>
+            </a:r>
+            <a:r>
+              <a:rPr lang="es-ES" sz="1200" dirty="0" smtClean="0">
+                <a:latin typeface="Arial" panose="020B0604020202020204" pitchFamily="34" charset="0"/>
+                <a:cs typeface="Arial" panose="020B0604020202020204" pitchFamily="34" charset="0"/>
+              </a:rPr>
+              <a:t>2016.</a:t>
             </a:r>
             <a:endParaRPr lang="es-ES" sz="1200" dirty="0">
               <a:latin typeface="Arial" panose="020B0604020202020204" pitchFamily="34" charset="0"/>

</xml_diff>